<commit_message>
Introduced SQS for queuing asynchrounous messaging
</commit_message>
<xml_diff>
--- a/carepay-systemdesign/System Design  Presentation - 2021.pptx
+++ b/carepay-systemdesign/System Design  Presentation - 2021.pptx
@@ -235,7 +235,7 @@
           <a:p>
             <a:fld id="{553D2A0B-DDF8-4C11-A796-3194FE56C759}" type="datetimeFigureOut">
               <a:rPr lang="ru-UA" smtClean="0"/>
-              <a:t>01/09/2022</a:t>
+              <a:t>01/10/2022</a:t>
             </a:fld>
             <a:endParaRPr lang="ru-UA"/>
           </a:p>
@@ -689,7 +689,7 @@
           <a:p>
             <a:fld id="{4AAD347D-5ACD-4C99-B74B-A9C85AD731AF}" type="datetimeFigureOut">
               <a:rPr lang="en-US" smtClean="0"/>
-              <a:t>1/9/2022</a:t>
+              <a:t>1/10/2022</a:t>
             </a:fld>
             <a:endParaRPr lang="en-US" dirty="0"/>
           </a:p>
@@ -964,7 +964,7 @@
           <a:p>
             <a:fld id="{4AAD347D-5ACD-4C99-B74B-A9C85AD731AF}" type="datetimeFigureOut">
               <a:rPr lang="en-US" smtClean="0"/>
-              <a:t>1/9/2022</a:t>
+              <a:t>1/10/2022</a:t>
             </a:fld>
             <a:endParaRPr lang="en-US" dirty="0"/>
           </a:p>
@@ -1160,7 +1160,7 @@
           <a:p>
             <a:fld id="{4AAD347D-5ACD-4C99-B74B-A9C85AD731AF}" type="datetimeFigureOut">
               <a:rPr lang="en-US" smtClean="0"/>
-              <a:t>1/9/2022</a:t>
+              <a:t>1/10/2022</a:t>
             </a:fld>
             <a:endParaRPr lang="en-US" dirty="0"/>
           </a:p>
@@ -1435,7 +1435,7 @@
           <a:p>
             <a:fld id="{4AAD347D-5ACD-4C99-B74B-A9C85AD731AF}" type="datetimeFigureOut">
               <a:rPr lang="en-US" smtClean="0"/>
-              <a:t>1/9/2022</a:t>
+              <a:t>1/10/2022</a:t>
             </a:fld>
             <a:endParaRPr lang="en-US" dirty="0"/>
           </a:p>
@@ -1778,7 +1778,7 @@
           <a:p>
             <a:fld id="{4AAD347D-5ACD-4C99-B74B-A9C85AD731AF}" type="datetimeFigureOut">
               <a:rPr lang="en-US" smtClean="0"/>
-              <a:t>1/9/2022</a:t>
+              <a:t>1/10/2022</a:t>
             </a:fld>
             <a:endParaRPr lang="en-US" dirty="0"/>
           </a:p>
@@ -2403,7 +2403,7 @@
           <a:p>
             <a:fld id="{4AAD347D-5ACD-4C99-B74B-A9C85AD731AF}" type="datetimeFigureOut">
               <a:rPr lang="en-US" smtClean="0"/>
-              <a:t>1/9/2022</a:t>
+              <a:t>1/10/2022</a:t>
             </a:fld>
             <a:endParaRPr lang="en-US" dirty="0"/>
           </a:p>
@@ -3265,7 +3265,7 @@
           <a:p>
             <a:fld id="{4AAD347D-5ACD-4C99-B74B-A9C85AD731AF}" type="datetimeFigureOut">
               <a:rPr lang="en-US" smtClean="0"/>
-              <a:t>1/9/2022</a:t>
+              <a:t>1/10/2022</a:t>
             </a:fld>
             <a:endParaRPr lang="en-US" dirty="0"/>
           </a:p>
@@ -3437,7 +3437,7 @@
           <a:p>
             <a:fld id="{4509A250-FF31-4206-8172-F9D3106AACB1}" type="datetimeFigureOut">
               <a:rPr lang="en-US" smtClean="0"/>
-              <a:t>1/9/2022</a:t>
+              <a:t>1/10/2022</a:t>
             </a:fld>
             <a:endParaRPr lang="en-US" dirty="0"/>
           </a:p>
@@ -3617,7 +3617,7 @@
           <a:p>
             <a:fld id="{4509A250-FF31-4206-8172-F9D3106AACB1}" type="datetimeFigureOut">
               <a:rPr lang="en-US" smtClean="0"/>
-              <a:t>1/9/2022</a:t>
+              <a:t>1/10/2022</a:t>
             </a:fld>
             <a:endParaRPr lang="en-US" dirty="0"/>
           </a:p>
@@ -34411,7 +34411,7 @@
           <a:p>
             <a:fld id="{4509A250-FF31-4206-8172-F9D3106AACB1}" type="datetimeFigureOut">
               <a:rPr lang="en-US" smtClean="0"/>
-              <a:t>1/9/2022</a:t>
+              <a:t>1/10/2022</a:t>
             </a:fld>
             <a:endParaRPr lang="en-US" dirty="0"/>
           </a:p>
@@ -35266,7 +35266,7 @@
           <a:p>
             <a:fld id="{9796027F-7875-4030-9381-8BD8C4F21935}" type="datetimeFigureOut">
               <a:rPr lang="en-US" smtClean="0"/>
-              <a:t>1/9/2022</a:t>
+              <a:t>1/10/2022</a:t>
             </a:fld>
             <a:endParaRPr lang="en-US" dirty="0"/>
           </a:p>
@@ -35558,7 +35558,7 @@
           <a:p>
             <a:fld id="{9796027F-7875-4030-9381-8BD8C4F21935}" type="datetimeFigureOut">
               <a:rPr lang="en-US" smtClean="0"/>
-              <a:t>1/9/2022</a:t>
+              <a:t>1/10/2022</a:t>
             </a:fld>
             <a:endParaRPr lang="en-US" dirty="0"/>
           </a:p>
@@ -36002,7 +36002,7 @@
           <a:p>
             <a:fld id="{9796027F-7875-4030-9381-8BD8C4F21935}" type="datetimeFigureOut">
               <a:rPr lang="en-US" smtClean="0"/>
-              <a:t>1/9/2022</a:t>
+              <a:t>1/10/2022</a:t>
             </a:fld>
             <a:endParaRPr lang="en-US" dirty="0"/>
           </a:p>
@@ -36120,7 +36120,7 @@
           <a:p>
             <a:fld id="{4509A250-FF31-4206-8172-F9D3106AACB1}" type="datetimeFigureOut">
               <a:rPr lang="en-US" smtClean="0"/>
-              <a:t>1/9/2022</a:t>
+              <a:t>1/10/2022</a:t>
             </a:fld>
             <a:endParaRPr lang="en-US" dirty="0"/>
           </a:p>
@@ -36424,7 +36424,7 @@
           <a:p>
             <a:fld id="{4509A250-FF31-4206-8172-F9D3106AACB1}" type="datetimeFigureOut">
               <a:rPr lang="en-US" smtClean="0"/>
-              <a:t>1/9/2022</a:t>
+              <a:t>1/10/2022</a:t>
             </a:fld>
             <a:endParaRPr lang="en-US" dirty="0"/>
           </a:p>
@@ -36703,7 +36703,7 @@
           <a:p>
             <a:fld id="{4509A250-FF31-4206-8172-F9D3106AACB1}" type="datetimeFigureOut">
               <a:rPr lang="en-US" smtClean="0"/>
-              <a:t>1/9/2022</a:t>
+              <a:t>1/10/2022</a:t>
             </a:fld>
             <a:endParaRPr lang="en-US" dirty="0"/>
           </a:p>
@@ -36978,7 +36978,7 @@
           <a:p>
             <a:fld id="{4509A250-FF31-4206-8172-F9D3106AACB1}" type="datetimeFigureOut">
               <a:rPr lang="en-US" smtClean="0"/>
-              <a:t>1/9/2022</a:t>
+              <a:t>1/10/2022</a:t>
             </a:fld>
             <a:endParaRPr lang="en-US" dirty="0"/>
           </a:p>
@@ -37407,7 +37407,7 @@
           <a:p>
             <a:fld id="{4AAD347D-5ACD-4C99-B74B-A9C85AD731AF}" type="datetimeFigureOut">
               <a:rPr lang="en-US" smtClean="0"/>
-              <a:t>1/9/2022</a:t>
+              <a:t>1/10/2022</a:t>
             </a:fld>
             <a:endParaRPr lang="en-US" dirty="0"/>
           </a:p>
@@ -38913,10 +38913,10 @@
       </p:sp>
       <p:pic>
         <p:nvPicPr>
-          <p:cNvPr id="12" name="Content Placeholder 11">
+          <p:cNvPr id="6" name="Content Placeholder 5">
             <a:extLst>
               <a:ext uri="{FF2B5EF4-FFF2-40B4-BE49-F238E27FC236}">
-                <a16:creationId xmlns:a16="http://schemas.microsoft.com/office/drawing/2014/main" id="{E88F1F9A-FCB2-439A-97BC-1F4B7AE85C2B}"/>
+                <a16:creationId xmlns:a16="http://schemas.microsoft.com/office/drawing/2014/main" id="{C5B38733-9231-4688-A9F8-44798BB80990}"/>
               </a:ext>
             </a:extLst>
           </p:cNvPr>
@@ -38941,8 +38941,8 @@
         </p:blipFill>
         <p:spPr>
           <a:xfrm>
-            <a:off x="963166" y="1853249"/>
-            <a:ext cx="9404723" cy="4857040"/>
+            <a:off x="886266" y="1853248"/>
+            <a:ext cx="10522632" cy="5110260"/>
           </a:xfrm>
         </p:spPr>
       </p:pic>
@@ -39153,10 +39153,10 @@
       </p:sp>
       <p:pic>
         <p:nvPicPr>
-          <p:cNvPr id="11" name="Content Placeholder 10">
+          <p:cNvPr id="6" name="Content Placeholder 5">
             <a:extLst>
               <a:ext uri="{FF2B5EF4-FFF2-40B4-BE49-F238E27FC236}">
-                <a16:creationId xmlns:a16="http://schemas.microsoft.com/office/drawing/2014/main" id="{211DB112-62E7-41F3-A121-519DA7AA3539}"/>
+                <a16:creationId xmlns:a16="http://schemas.microsoft.com/office/drawing/2014/main" id="{1000F122-9D37-483D-B144-1A868B9551C7}"/>
               </a:ext>
             </a:extLst>
           </p:cNvPr>
@@ -39181,8 +39181,8 @@
         </p:blipFill>
         <p:spPr>
           <a:xfrm>
-            <a:off x="1160114" y="1195754"/>
-            <a:ext cx="9404723" cy="5486400"/>
+            <a:off x="1012875" y="1322363"/>
+            <a:ext cx="10002128" cy="5535637"/>
           </a:xfrm>
         </p:spPr>
       </p:pic>

</xml_diff>